<commit_message>
Finished Yukteshwar's comments and also edited PBM equations to fit the model we used. Edited Flowchart
</commit_message>
<xml_diff>
--- a/paper/Figures/flowchart.pptx
+++ b/paper/Figures/flowchart.pptx
@@ -112,6 +112,14 @@
 </p:presentation>
 </file>
 
+<file path=ppt/revisionInfo.xml><?xml version="1.0" encoding="utf-8"?>
+<p1510:revInfo xmlns:a="http://schemas.openxmlformats.org/drawingml/2006/main" xmlns:r="http://schemas.openxmlformats.org/officeDocument/2006/relationships" xmlns:p1510="http://schemas.microsoft.com/office/powerpoint/2015/10/main">
+  <p1510:revLst>
+    <p1510:client id="{DB0A5C89-52D2-4CEF-AD9E-2D51904B302A}" v="2" dt="2019-11-07T21:10:12.713"/>
+  </p1510:revLst>
+</p1510:revInfo>
+</file>
+
 <file path=ppt/changesInfos/changesInfo1.xml><?xml version="1.0" encoding="utf-8"?>
 <pc:chgInfo xmlns:a="http://schemas.openxmlformats.org/drawingml/2006/main" xmlns:r="http://schemas.openxmlformats.org/officeDocument/2006/relationships" xmlns:ac="http://schemas.microsoft.com/office/drawing/2013/main/command" xmlns:pc="http://schemas.microsoft.com/office/powerpoint/2013/main/command">
   <pc:docChgLst>
@@ -197,6 +205,286 @@
             <pc:docMk/>
             <pc:sldMk cId="3528830019" sldId="259"/>
             <ac:cxnSpMk id="67" creationId="{F52A092C-BABE-4EBE-BA00-D8C69889DB37}"/>
+          </ac:cxnSpMkLst>
+        </pc:cxnChg>
+      </pc:sldChg>
+    </pc:docChg>
+  </pc:docChgLst>
+  <pc:docChgLst>
+    <pc:chgData name="Chaitanya Sampat" userId="a240db940af4542c" providerId="LiveId" clId="{DB0A5C89-52D2-4CEF-AD9E-2D51904B302A}"/>
+    <pc:docChg chg="undo custSel modSld">
+      <pc:chgData name="Chaitanya Sampat" userId="a240db940af4542c" providerId="LiveId" clId="{DB0A5C89-52D2-4CEF-AD9E-2D51904B302A}" dt="2019-11-07T21:18:30.940" v="178" actId="1076"/>
+      <pc:docMkLst>
+        <pc:docMk/>
+      </pc:docMkLst>
+      <pc:sldChg chg="addSp delSp modSp">
+        <pc:chgData name="Chaitanya Sampat" userId="a240db940af4542c" providerId="LiveId" clId="{DB0A5C89-52D2-4CEF-AD9E-2D51904B302A}" dt="2019-11-07T21:18:30.940" v="178" actId="1076"/>
+        <pc:sldMkLst>
+          <pc:docMk/>
+          <pc:sldMk cId="3528830019" sldId="259"/>
+        </pc:sldMkLst>
+        <pc:spChg chg="mod">
+          <ac:chgData name="Chaitanya Sampat" userId="a240db940af4542c" providerId="LiveId" clId="{DB0A5C89-52D2-4CEF-AD9E-2D51904B302A}" dt="2019-11-07T21:18:27.812" v="177" actId="1076"/>
+          <ac:spMkLst>
+            <pc:docMk/>
+            <pc:sldMk cId="3528830019" sldId="259"/>
+            <ac:spMk id="9" creationId="{BBC23FCA-500F-4E76-94E7-36ACBA6AC644}"/>
+          </ac:spMkLst>
+        </pc:spChg>
+        <pc:spChg chg="mod">
+          <ac:chgData name="Chaitanya Sampat" userId="a240db940af4542c" providerId="LiveId" clId="{DB0A5C89-52D2-4CEF-AD9E-2D51904B302A}" dt="2019-11-07T21:16:40.458" v="147" actId="1038"/>
+          <ac:spMkLst>
+            <pc:docMk/>
+            <pc:sldMk cId="3528830019" sldId="259"/>
+            <ac:spMk id="12" creationId="{EAF7EE59-BD16-4CD5-98EC-C97DF582B3B8}"/>
+          </ac:spMkLst>
+        </pc:spChg>
+        <pc:spChg chg="mod">
+          <ac:chgData name="Chaitanya Sampat" userId="a240db940af4542c" providerId="LiveId" clId="{DB0A5C89-52D2-4CEF-AD9E-2D51904B302A}" dt="2019-11-07T21:18:00.760" v="160" actId="1038"/>
+          <ac:spMkLst>
+            <pc:docMk/>
+            <pc:sldMk cId="3528830019" sldId="259"/>
+            <ac:spMk id="13" creationId="{EEEAA0D7-2BCB-4053-83D0-578479F1994F}"/>
+          </ac:spMkLst>
+        </pc:spChg>
+        <pc:spChg chg="mod">
+          <ac:chgData name="Chaitanya Sampat" userId="a240db940af4542c" providerId="LiveId" clId="{DB0A5C89-52D2-4CEF-AD9E-2D51904B302A}" dt="2019-11-07T21:16:40.458" v="147" actId="1038"/>
+          <ac:spMkLst>
+            <pc:docMk/>
+            <pc:sldMk cId="3528830019" sldId="259"/>
+            <ac:spMk id="21" creationId="{1A966196-BCBE-44A0-B7AF-C991DD60CF82}"/>
+          </ac:spMkLst>
+        </pc:spChg>
+        <pc:spChg chg="mod">
+          <ac:chgData name="Chaitanya Sampat" userId="a240db940af4542c" providerId="LiveId" clId="{DB0A5C89-52D2-4CEF-AD9E-2D51904B302A}" dt="2019-11-07T21:16:40.458" v="147" actId="1038"/>
+          <ac:spMkLst>
+            <pc:docMk/>
+            <pc:sldMk cId="3528830019" sldId="259"/>
+            <ac:spMk id="40" creationId="{6C6D60A4-94AD-4A7F-A507-CD12A199C25A}"/>
+          </ac:spMkLst>
+        </pc:spChg>
+        <pc:spChg chg="mod">
+          <ac:chgData name="Chaitanya Sampat" userId="a240db940af4542c" providerId="LiveId" clId="{DB0A5C89-52D2-4CEF-AD9E-2D51904B302A}" dt="2019-11-07T21:18:00.760" v="160" actId="1038"/>
+          <ac:spMkLst>
+            <pc:docMk/>
+            <pc:sldMk cId="3528830019" sldId="259"/>
+            <ac:spMk id="41" creationId="{48CBA881-A435-4C7B-A608-DAB776FBEB2E}"/>
+          </ac:spMkLst>
+        </pc:spChg>
+        <pc:spChg chg="mod">
+          <ac:chgData name="Chaitanya Sampat" userId="a240db940af4542c" providerId="LiveId" clId="{DB0A5C89-52D2-4CEF-AD9E-2D51904B302A}" dt="2019-11-07T21:16:40.458" v="147" actId="1038"/>
+          <ac:spMkLst>
+            <pc:docMk/>
+            <pc:sldMk cId="3528830019" sldId="259"/>
+            <ac:spMk id="44" creationId="{963D2827-7DC3-41A3-9FB7-DF6FEF20D06F}"/>
+          </ac:spMkLst>
+        </pc:spChg>
+        <pc:spChg chg="mod">
+          <ac:chgData name="Chaitanya Sampat" userId="a240db940af4542c" providerId="LiveId" clId="{DB0A5C89-52D2-4CEF-AD9E-2D51904B302A}" dt="2019-11-07T21:18:00.760" v="160" actId="1038"/>
+          <ac:spMkLst>
+            <pc:docMk/>
+            <pc:sldMk cId="3528830019" sldId="259"/>
+            <ac:spMk id="46" creationId="{028A6B5C-72CD-4B31-84E6-450EF0B8C671}"/>
+          </ac:spMkLst>
+        </pc:spChg>
+        <pc:spChg chg="mod">
+          <ac:chgData name="Chaitanya Sampat" userId="a240db940af4542c" providerId="LiveId" clId="{DB0A5C89-52D2-4CEF-AD9E-2D51904B302A}" dt="2019-11-07T21:16:40.458" v="147" actId="1038"/>
+          <ac:spMkLst>
+            <pc:docMk/>
+            <pc:sldMk cId="3528830019" sldId="259"/>
+            <ac:spMk id="49" creationId="{A2AAEB1E-4F64-405F-BD8C-2C5B37F9C133}"/>
+          </ac:spMkLst>
+        </pc:spChg>
+        <pc:spChg chg="mod">
+          <ac:chgData name="Chaitanya Sampat" userId="a240db940af4542c" providerId="LiveId" clId="{DB0A5C89-52D2-4CEF-AD9E-2D51904B302A}" dt="2019-11-07T21:18:00.760" v="160" actId="1038"/>
+          <ac:spMkLst>
+            <pc:docMk/>
+            <pc:sldMk cId="3528830019" sldId="259"/>
+            <ac:spMk id="51" creationId="{323DD0F5-6E90-4093-AC51-3AB47895A858}"/>
+          </ac:spMkLst>
+        </pc:spChg>
+        <pc:spChg chg="mod">
+          <ac:chgData name="Chaitanya Sampat" userId="a240db940af4542c" providerId="LiveId" clId="{DB0A5C89-52D2-4CEF-AD9E-2D51904B302A}" dt="2019-11-07T21:16:40.458" v="147" actId="1038"/>
+          <ac:spMkLst>
+            <pc:docMk/>
+            <pc:sldMk cId="3528830019" sldId="259"/>
+            <ac:spMk id="54" creationId="{60DF4BEC-C734-41BA-AB86-7200BB847A22}"/>
+          </ac:spMkLst>
+        </pc:spChg>
+        <pc:spChg chg="mod">
+          <ac:chgData name="Chaitanya Sampat" userId="a240db940af4542c" providerId="LiveId" clId="{DB0A5C89-52D2-4CEF-AD9E-2D51904B302A}" dt="2019-11-07T21:18:00.760" v="160" actId="1038"/>
+          <ac:spMkLst>
+            <pc:docMk/>
+            <pc:sldMk cId="3528830019" sldId="259"/>
+            <ac:spMk id="56" creationId="{3CCE7D23-0943-4ED6-9B23-EC2D95E8E646}"/>
+          </ac:spMkLst>
+        </pc:spChg>
+        <pc:spChg chg="mod">
+          <ac:chgData name="Chaitanya Sampat" userId="a240db940af4542c" providerId="LiveId" clId="{DB0A5C89-52D2-4CEF-AD9E-2D51904B302A}" dt="2019-11-07T21:18:30.940" v="178" actId="1076"/>
+          <ac:spMkLst>
+            <pc:docMk/>
+            <pc:sldMk cId="3528830019" sldId="259"/>
+            <ac:spMk id="60" creationId="{455520D2-1E2B-4E13-B1FB-42E1257CE154}"/>
+          </ac:spMkLst>
+        </pc:spChg>
+        <pc:spChg chg="mod">
+          <ac:chgData name="Chaitanya Sampat" userId="a240db940af4542c" providerId="LiveId" clId="{DB0A5C89-52D2-4CEF-AD9E-2D51904B302A}" dt="2019-11-07T21:18:00.760" v="160" actId="1038"/>
+          <ac:spMkLst>
+            <pc:docMk/>
+            <pc:sldMk cId="3528830019" sldId="259"/>
+            <ac:spMk id="68" creationId="{F35BAFC2-9422-46E2-BCDC-263B922703BA}"/>
+          </ac:spMkLst>
+        </pc:spChg>
+        <pc:spChg chg="mod">
+          <ac:chgData name="Chaitanya Sampat" userId="a240db940af4542c" providerId="LiveId" clId="{DB0A5C89-52D2-4CEF-AD9E-2D51904B302A}" dt="2019-11-07T21:13:03.074" v="25" actId="1076"/>
+          <ac:spMkLst>
+            <pc:docMk/>
+            <pc:sldMk cId="3528830019" sldId="259"/>
+            <ac:spMk id="87" creationId="{AD1829ED-ED9B-48A4-A913-9C4B0F89E684}"/>
+          </ac:spMkLst>
+        </pc:spChg>
+        <pc:spChg chg="del">
+          <ac:chgData name="Chaitanya Sampat" userId="a240db940af4542c" providerId="LiveId" clId="{DB0A5C89-52D2-4CEF-AD9E-2D51904B302A}" dt="2019-11-07T21:09:28.847" v="9" actId="478"/>
+          <ac:spMkLst>
+            <pc:docMk/>
+            <pc:sldMk cId="3528830019" sldId="259"/>
+            <ac:spMk id="88" creationId="{5BD200E7-0980-4AAC-A93C-25B2AF163621}"/>
+          </ac:spMkLst>
+        </pc:spChg>
+        <pc:spChg chg="mod">
+          <ac:chgData name="Chaitanya Sampat" userId="a240db940af4542c" providerId="LiveId" clId="{DB0A5C89-52D2-4CEF-AD9E-2D51904B302A}" dt="2019-11-07T21:09:25.008" v="8" actId="20577"/>
+          <ac:spMkLst>
+            <pc:docMk/>
+            <pc:sldMk cId="3528830019" sldId="259"/>
+            <ac:spMk id="90" creationId="{06DEA0D2-5A31-4234-8F21-2032173E5BFB}"/>
+          </ac:spMkLst>
+        </pc:spChg>
+        <pc:spChg chg="mod">
+          <ac:chgData name="Chaitanya Sampat" userId="a240db940af4542c" providerId="LiveId" clId="{DB0A5C89-52D2-4CEF-AD9E-2D51904B302A}" dt="2019-11-07T21:16:40.458" v="147" actId="1038"/>
+          <ac:spMkLst>
+            <pc:docMk/>
+            <pc:sldMk cId="3528830019" sldId="259"/>
+            <ac:spMk id="101" creationId="{4905F413-099C-4A0E-AC64-E119CC947684}"/>
+          </ac:spMkLst>
+        </pc:spChg>
+        <pc:spChg chg="mod">
+          <ac:chgData name="Chaitanya Sampat" userId="a240db940af4542c" providerId="LiveId" clId="{DB0A5C89-52D2-4CEF-AD9E-2D51904B302A}" dt="2019-11-07T21:13:50.879" v="35" actId="14100"/>
+          <ac:spMkLst>
+            <pc:docMk/>
+            <pc:sldMk cId="3528830019" sldId="259"/>
+            <ac:spMk id="103" creationId="{7954AB9D-4A89-4502-8054-1429ECAC290F}"/>
+          </ac:spMkLst>
+        </pc:spChg>
+        <pc:spChg chg="mod">
+          <ac:chgData name="Chaitanya Sampat" userId="a240db940af4542c" providerId="LiveId" clId="{DB0A5C89-52D2-4CEF-AD9E-2D51904B302A}" dt="2019-11-07T21:16:40.458" v="147" actId="1038"/>
+          <ac:spMkLst>
+            <pc:docMk/>
+            <pc:sldMk cId="3528830019" sldId="259"/>
+            <ac:spMk id="109" creationId="{F0C3209D-B357-4978-A399-10D14AB28F87}"/>
+          </ac:spMkLst>
+        </pc:spChg>
+        <pc:cxnChg chg="add del mod">
+          <ac:chgData name="Chaitanya Sampat" userId="a240db940af4542c" providerId="LiveId" clId="{DB0A5C89-52D2-4CEF-AD9E-2D51904B302A}" dt="2019-11-07T21:09:53.935" v="11" actId="478"/>
+          <ac:cxnSpMkLst>
+            <pc:docMk/>
+            <pc:sldMk cId="3528830019" sldId="259"/>
+            <ac:cxnSpMk id="6" creationId="{D1EE64AB-0FCB-4278-9E43-E3313BAAE9A7}"/>
+          </ac:cxnSpMkLst>
+        </pc:cxnChg>
+        <pc:cxnChg chg="mod">
+          <ac:chgData name="Chaitanya Sampat" userId="a240db940af4542c" providerId="LiveId" clId="{DB0A5C89-52D2-4CEF-AD9E-2D51904B302A}" dt="2019-11-07T21:16:40.458" v="147" actId="1038"/>
+          <ac:cxnSpMkLst>
+            <pc:docMk/>
+            <pc:sldMk cId="3528830019" sldId="259"/>
+            <ac:cxnSpMk id="10" creationId="{2BAD9BBE-22DB-498E-975C-CE4495F0E961}"/>
+          </ac:cxnSpMkLst>
+        </pc:cxnChg>
+        <pc:cxnChg chg="add mod">
+          <ac:chgData name="Chaitanya Sampat" userId="a240db940af4542c" providerId="LiveId" clId="{DB0A5C89-52D2-4CEF-AD9E-2D51904B302A}" dt="2019-11-07T21:13:40.936" v="34" actId="14100"/>
+          <ac:cxnSpMkLst>
+            <pc:docMk/>
+            <pc:sldMk cId="3528830019" sldId="259"/>
+            <ac:cxnSpMk id="15" creationId="{8CB93E0E-7B5D-4419-80CC-C033C6958225}"/>
+          </ac:cxnSpMkLst>
+        </pc:cxnChg>
+        <pc:cxnChg chg="mod">
+          <ac:chgData name="Chaitanya Sampat" userId="a240db940af4542c" providerId="LiveId" clId="{DB0A5C89-52D2-4CEF-AD9E-2D51904B302A}" dt="2019-11-07T21:16:54.529" v="148" actId="14100"/>
+          <ac:cxnSpMkLst>
+            <pc:docMk/>
+            <pc:sldMk cId="3528830019" sldId="259"/>
+            <ac:cxnSpMk id="20" creationId="{8E78C666-B6CB-4907-B37A-92207FAF2746}"/>
+          </ac:cxnSpMkLst>
+        </pc:cxnChg>
+        <pc:cxnChg chg="mod">
+          <ac:chgData name="Chaitanya Sampat" userId="a240db940af4542c" providerId="LiveId" clId="{DB0A5C89-52D2-4CEF-AD9E-2D51904B302A}" dt="2019-11-07T21:17:43.840" v="154" actId="14100"/>
+          <ac:cxnSpMkLst>
+            <pc:docMk/>
+            <pc:sldMk cId="3528830019" sldId="259"/>
+            <ac:cxnSpMk id="39" creationId="{E5199ED1-2BF8-40F0-84BD-8200A44DA457}"/>
+          </ac:cxnSpMkLst>
+        </pc:cxnChg>
+        <pc:cxnChg chg="mod">
+          <ac:chgData name="Chaitanya Sampat" userId="a240db940af4542c" providerId="LiveId" clId="{DB0A5C89-52D2-4CEF-AD9E-2D51904B302A}" dt="2019-11-07T21:17:40.518" v="153" actId="14100"/>
+          <ac:cxnSpMkLst>
+            <pc:docMk/>
+            <pc:sldMk cId="3528830019" sldId="259"/>
+            <ac:cxnSpMk id="43" creationId="{C22CDE34-E503-4494-A2D5-6F0CCAACF5F6}"/>
+          </ac:cxnSpMkLst>
+        </pc:cxnChg>
+        <pc:cxnChg chg="mod">
+          <ac:chgData name="Chaitanya Sampat" userId="a240db940af4542c" providerId="LiveId" clId="{DB0A5C89-52D2-4CEF-AD9E-2D51904B302A}" dt="2019-11-07T21:17:22.795" v="152" actId="14100"/>
+          <ac:cxnSpMkLst>
+            <pc:docMk/>
+            <pc:sldMk cId="3528830019" sldId="259"/>
+            <ac:cxnSpMk id="48" creationId="{2A22DBD5-F289-46AC-8CC2-D7E8B556048A}"/>
+          </ac:cxnSpMkLst>
+        </pc:cxnChg>
+        <pc:cxnChg chg="mod">
+          <ac:chgData name="Chaitanya Sampat" userId="a240db940af4542c" providerId="LiveId" clId="{DB0A5C89-52D2-4CEF-AD9E-2D51904B302A}" dt="2019-11-07T21:17:16.874" v="151" actId="14100"/>
+          <ac:cxnSpMkLst>
+            <pc:docMk/>
+            <pc:sldMk cId="3528830019" sldId="259"/>
+            <ac:cxnSpMk id="53" creationId="{29C70639-E3E8-48F1-AF5F-B6E4E4266E49}"/>
+          </ac:cxnSpMkLst>
+        </pc:cxnChg>
+        <pc:cxnChg chg="mod">
+          <ac:chgData name="Chaitanya Sampat" userId="a240db940af4542c" providerId="LiveId" clId="{DB0A5C89-52D2-4CEF-AD9E-2D51904B302A}" dt="2019-11-07T21:17:00.639" v="149" actId="14100"/>
+          <ac:cxnSpMkLst>
+            <pc:docMk/>
+            <pc:sldMk cId="3528830019" sldId="259"/>
+            <ac:cxnSpMk id="58" creationId="{354E77C4-4601-4D4D-A8E4-A3885AAC9F77}"/>
+          </ac:cxnSpMkLst>
+        </pc:cxnChg>
+        <pc:cxnChg chg="mod">
+          <ac:chgData name="Chaitanya Sampat" userId="a240db940af4542c" providerId="LiveId" clId="{DB0A5C89-52D2-4CEF-AD9E-2D51904B302A}" dt="2019-11-07T21:18:11.041" v="161" actId="14100"/>
+          <ac:cxnSpMkLst>
+            <pc:docMk/>
+            <pc:sldMk cId="3528830019" sldId="259"/>
+            <ac:cxnSpMk id="64" creationId="{32F56F14-A7DA-4A3B-82AF-7DB820EE4A2A}"/>
+          </ac:cxnSpMkLst>
+        </pc:cxnChg>
+        <pc:cxnChg chg="mod">
+          <ac:chgData name="Chaitanya Sampat" userId="a240db940af4542c" providerId="LiveId" clId="{DB0A5C89-52D2-4CEF-AD9E-2D51904B302A}" dt="2019-11-07T21:16:40.458" v="147" actId="1038"/>
+          <ac:cxnSpMkLst>
+            <pc:docMk/>
+            <pc:sldMk cId="3528830019" sldId="259"/>
+            <ac:cxnSpMk id="66" creationId="{423E5818-3529-4710-99B3-D2FB01F6903A}"/>
+          </ac:cxnSpMkLst>
+        </pc:cxnChg>
+        <pc:cxnChg chg="mod">
+          <ac:chgData name="Chaitanya Sampat" userId="a240db940af4542c" providerId="LiveId" clId="{DB0A5C89-52D2-4CEF-AD9E-2D51904B302A}" dt="2019-11-07T21:16:40.458" v="147" actId="1038"/>
+          <ac:cxnSpMkLst>
+            <pc:docMk/>
+            <pc:sldMk cId="3528830019" sldId="259"/>
+            <ac:cxnSpMk id="67" creationId="{F52A092C-BABE-4EBE-BA00-D8C69889DB37}"/>
+          </ac:cxnSpMkLst>
+        </pc:cxnChg>
+        <pc:cxnChg chg="del mod">
+          <ac:chgData name="Chaitanya Sampat" userId="a240db940af4542c" providerId="LiveId" clId="{DB0A5C89-52D2-4CEF-AD9E-2D51904B302A}" dt="2019-11-07T21:10:00.728" v="12" actId="478"/>
+          <ac:cxnSpMkLst>
+            <pc:docMk/>
+            <pc:sldMk cId="3528830019" sldId="259"/>
+            <ac:cxnSpMk id="86" creationId="{732E2640-5DE5-4198-B6F4-0427A95E1FE0}"/>
           </ac:cxnSpMkLst>
         </pc:cxnChg>
       </pc:sldChg>
@@ -824,7 +1112,7 @@
           <a:p>
             <a:fld id="{29922BF9-25C6-418E-B5F4-E8BA08A883D2}" type="datetimeFigureOut">
               <a:rPr lang="en-US" smtClean="0"/>
-              <a:t>10/8/2019</a:t>
+              <a:t>11/7/2019</a:t>
             </a:fld>
             <a:endParaRPr lang="en-US"/>
           </a:p>
@@ -994,7 +1282,7 @@
           <a:p>
             <a:fld id="{29922BF9-25C6-418E-B5F4-E8BA08A883D2}" type="datetimeFigureOut">
               <a:rPr lang="en-US" smtClean="0"/>
-              <a:t>10/8/2019</a:t>
+              <a:t>11/7/2019</a:t>
             </a:fld>
             <a:endParaRPr lang="en-US"/>
           </a:p>
@@ -1174,7 +1462,7 @@
           <a:p>
             <a:fld id="{29922BF9-25C6-418E-B5F4-E8BA08A883D2}" type="datetimeFigureOut">
               <a:rPr lang="en-US" smtClean="0"/>
-              <a:t>10/8/2019</a:t>
+              <a:t>11/7/2019</a:t>
             </a:fld>
             <a:endParaRPr lang="en-US"/>
           </a:p>
@@ -1344,7 +1632,7 @@
           <a:p>
             <a:fld id="{29922BF9-25C6-418E-B5F4-E8BA08A883D2}" type="datetimeFigureOut">
               <a:rPr lang="en-US" smtClean="0"/>
-              <a:t>10/8/2019</a:t>
+              <a:t>11/7/2019</a:t>
             </a:fld>
             <a:endParaRPr lang="en-US"/>
           </a:p>
@@ -1588,7 +1876,7 @@
           <a:p>
             <a:fld id="{29922BF9-25C6-418E-B5F4-E8BA08A883D2}" type="datetimeFigureOut">
               <a:rPr lang="en-US" smtClean="0"/>
-              <a:t>10/8/2019</a:t>
+              <a:t>11/7/2019</a:t>
             </a:fld>
             <a:endParaRPr lang="en-US"/>
           </a:p>
@@ -1820,7 +2108,7 @@
           <a:p>
             <a:fld id="{29922BF9-25C6-418E-B5F4-E8BA08A883D2}" type="datetimeFigureOut">
               <a:rPr lang="en-US" smtClean="0"/>
-              <a:t>10/8/2019</a:t>
+              <a:t>11/7/2019</a:t>
             </a:fld>
             <a:endParaRPr lang="en-US"/>
           </a:p>
@@ -2187,7 +2475,7 @@
           <a:p>
             <a:fld id="{29922BF9-25C6-418E-B5F4-E8BA08A883D2}" type="datetimeFigureOut">
               <a:rPr lang="en-US" smtClean="0"/>
-              <a:t>10/8/2019</a:t>
+              <a:t>11/7/2019</a:t>
             </a:fld>
             <a:endParaRPr lang="en-US"/>
           </a:p>
@@ -2305,7 +2593,7 @@
           <a:p>
             <a:fld id="{29922BF9-25C6-418E-B5F4-E8BA08A883D2}" type="datetimeFigureOut">
               <a:rPr lang="en-US" smtClean="0"/>
-              <a:t>10/8/2019</a:t>
+              <a:t>11/7/2019</a:t>
             </a:fld>
             <a:endParaRPr lang="en-US"/>
           </a:p>
@@ -2400,7 +2688,7 @@
           <a:p>
             <a:fld id="{29922BF9-25C6-418E-B5F4-E8BA08A883D2}" type="datetimeFigureOut">
               <a:rPr lang="en-US" smtClean="0"/>
-              <a:t>10/8/2019</a:t>
+              <a:t>11/7/2019</a:t>
             </a:fld>
             <a:endParaRPr lang="en-US"/>
           </a:p>
@@ -2677,7 +2965,7 @@
           <a:p>
             <a:fld id="{29922BF9-25C6-418E-B5F4-E8BA08A883D2}" type="datetimeFigureOut">
               <a:rPr lang="en-US" smtClean="0"/>
-              <a:t>10/8/2019</a:t>
+              <a:t>11/7/2019</a:t>
             </a:fld>
             <a:endParaRPr lang="en-US"/>
           </a:p>
@@ -2934,7 +3222,7 @@
           <a:p>
             <a:fld id="{29922BF9-25C6-418E-B5F4-E8BA08A883D2}" type="datetimeFigureOut">
               <a:rPr lang="en-US" smtClean="0"/>
-              <a:t>10/8/2019</a:t>
+              <a:t>11/7/2019</a:t>
             </a:fld>
             <a:endParaRPr lang="en-US"/>
           </a:p>
@@ -3147,7 +3435,7 @@
           <a:p>
             <a:fld id="{29922BF9-25C6-418E-B5F4-E8BA08A883D2}" type="datetimeFigureOut">
               <a:rPr lang="en-US" smtClean="0"/>
-              <a:t>10/8/2019</a:t>
+              <a:t>11/7/2019</a:t>
             </a:fld>
             <a:endParaRPr lang="en-US"/>
           </a:p>
@@ -3737,7 +4025,7 @@
         <p:spPr>
           <a:xfrm>
             <a:off x="2136379" y="1328179"/>
-            <a:ext cx="1131532" cy="0"/>
+            <a:ext cx="1264882" cy="0"/>
           </a:xfrm>
           <a:prstGeom prst="straightConnector1">
             <a:avLst/>
@@ -3775,7 +4063,7 @@
         </p:nvSpPr>
         <p:spPr>
           <a:xfrm>
-            <a:off x="3223205" y="1149354"/>
+            <a:off x="3356555" y="1149354"/>
             <a:ext cx="1101144" cy="357649"/>
           </a:xfrm>
           <a:prstGeom prst="parallelogram">
@@ -3834,7 +4122,7 @@
         </p:nvSpPr>
         <p:spPr>
           <a:xfrm>
-            <a:off x="2270767" y="1158662"/>
+            <a:off x="2355269" y="1033718"/>
             <a:ext cx="914400" cy="349905"/>
           </a:xfrm>
           <a:prstGeom prst="rect">
@@ -3980,7 +4268,7 @@
         <p:spPr>
           <a:xfrm>
             <a:off x="2171284" y="1826811"/>
-            <a:ext cx="1096627" cy="0"/>
+            <a:ext cx="1206079" cy="0"/>
           </a:xfrm>
           <a:prstGeom prst="straightConnector1">
             <a:avLst/>
@@ -4018,7 +4306,7 @@
         </p:nvSpPr>
         <p:spPr>
           <a:xfrm>
-            <a:off x="3244013" y="1735349"/>
+            <a:off x="3377363" y="1735349"/>
             <a:ext cx="1038384" cy="357649"/>
           </a:xfrm>
           <a:prstGeom prst="rect">
@@ -4237,7 +4525,7 @@
         </p:nvSpPr>
         <p:spPr>
           <a:xfrm>
-            <a:off x="2212578" y="1654439"/>
+            <a:off x="2347198" y="1549664"/>
             <a:ext cx="914400" cy="338554"/>
           </a:xfrm>
           <a:prstGeom prst="rect">
@@ -4481,14 +4769,15 @@
           </p:cNvPr>
           <p:cNvCxnSpPr>
             <a:cxnSpLocks/>
+            <a:stCxn id="37" idx="3"/>
             <a:endCxn id="40" idx="5"/>
           </p:cNvCxnSpPr>
           <p:nvPr/>
         </p:nvCxnSpPr>
         <p:spPr>
           <a:xfrm>
-            <a:off x="2181084" y="3817371"/>
-            <a:ext cx="1131533" cy="4"/>
+            <a:off x="2181833" y="3817375"/>
+            <a:ext cx="1264134" cy="0"/>
           </a:xfrm>
           <a:prstGeom prst="straightConnector1">
             <a:avLst/>
@@ -4526,7 +4815,7 @@
         </p:nvSpPr>
         <p:spPr>
           <a:xfrm>
-            <a:off x="3267911" y="3638550"/>
+            <a:off x="3401261" y="3638550"/>
             <a:ext cx="1101144" cy="357649"/>
           </a:xfrm>
           <a:prstGeom prst="parallelogram">
@@ -4585,8 +4874,8 @@
         </p:nvSpPr>
         <p:spPr>
           <a:xfrm>
-            <a:off x="2262133" y="3647858"/>
-            <a:ext cx="914400" cy="349905"/>
+            <a:off x="2369705" y="3533558"/>
+            <a:ext cx="890647" cy="349905"/>
           </a:xfrm>
           <a:prstGeom prst="rect">
             <a:avLst/>
@@ -4682,14 +4971,15 @@
           </p:cNvPr>
           <p:cNvCxnSpPr>
             <a:cxnSpLocks/>
+            <a:stCxn id="42" idx="3"/>
             <a:endCxn id="44" idx="1"/>
           </p:cNvCxnSpPr>
           <p:nvPr/>
         </p:nvCxnSpPr>
         <p:spPr>
-          <a:xfrm flipV="1">
-            <a:off x="2177917" y="4353846"/>
-            <a:ext cx="1072729" cy="1538"/>
+          <a:xfrm>
+            <a:off x="2177917" y="4353845"/>
+            <a:ext cx="1206079" cy="1"/>
           </a:xfrm>
           <a:prstGeom prst="straightConnector1">
             <a:avLst/>
@@ -4727,7 +5017,7 @@
         </p:nvSpPr>
         <p:spPr>
           <a:xfrm>
-            <a:off x="3250646" y="4175021"/>
+            <a:off x="3383996" y="4175021"/>
             <a:ext cx="1038384" cy="357649"/>
           </a:xfrm>
           <a:prstGeom prst="rect">
@@ -4840,7 +5130,7 @@
         </p:nvSpPr>
         <p:spPr>
           <a:xfrm>
-            <a:off x="2266836" y="4183011"/>
+            <a:off x="2350656" y="4078236"/>
             <a:ext cx="914400" cy="338554"/>
           </a:xfrm>
           <a:prstGeom prst="rect">
@@ -4937,14 +5227,15 @@
           </p:cNvPr>
           <p:cNvCxnSpPr>
             <a:cxnSpLocks/>
+            <a:stCxn id="47" idx="3"/>
             <a:endCxn id="49" idx="1"/>
           </p:cNvCxnSpPr>
           <p:nvPr/>
         </p:nvCxnSpPr>
         <p:spPr>
-          <a:xfrm flipV="1">
-            <a:off x="2177917" y="4937577"/>
-            <a:ext cx="1066379" cy="1538"/>
+          <a:xfrm>
+            <a:off x="2177917" y="4937576"/>
+            <a:ext cx="1199729" cy="1"/>
           </a:xfrm>
           <a:prstGeom prst="straightConnector1">
             <a:avLst/>
@@ -4982,7 +5273,7 @@
         </p:nvSpPr>
         <p:spPr>
           <a:xfrm>
-            <a:off x="3244296" y="4758752"/>
+            <a:off x="3377646" y="4758752"/>
             <a:ext cx="1038384" cy="357649"/>
           </a:xfrm>
           <a:prstGeom prst="rect">
@@ -5087,7 +5378,7 @@
         </p:nvSpPr>
         <p:spPr>
           <a:xfrm>
-            <a:off x="2257311" y="4766742"/>
+            <a:off x="2350656" y="4652442"/>
             <a:ext cx="914400" cy="338554"/>
           </a:xfrm>
           <a:prstGeom prst="rect">
@@ -5184,14 +5475,15 @@
           </p:cNvPr>
           <p:cNvCxnSpPr>
             <a:cxnSpLocks/>
+            <a:stCxn id="52" idx="3"/>
             <a:endCxn id="54" idx="1"/>
           </p:cNvCxnSpPr>
           <p:nvPr/>
         </p:nvCxnSpPr>
         <p:spPr>
-          <a:xfrm flipV="1">
-            <a:off x="2177917" y="5529299"/>
-            <a:ext cx="1066379" cy="1538"/>
+          <a:xfrm>
+            <a:off x="2177917" y="5529298"/>
+            <a:ext cx="1199729" cy="1"/>
           </a:xfrm>
           <a:prstGeom prst="straightConnector1">
             <a:avLst/>
@@ -5229,7 +5521,7 @@
         </p:nvSpPr>
         <p:spPr>
           <a:xfrm>
-            <a:off x="3244296" y="5350474"/>
+            <a:off x="3377646" y="5350474"/>
             <a:ext cx="1038384" cy="357649"/>
           </a:xfrm>
           <a:prstGeom prst="rect">
@@ -5342,7 +5634,7 @@
         </p:nvSpPr>
         <p:spPr>
           <a:xfrm>
-            <a:off x="2285886" y="5358464"/>
+            <a:off x="2339020" y="5240221"/>
             <a:ext cx="914400" cy="338554"/>
           </a:xfrm>
           <a:prstGeom prst="rect">
@@ -5381,7 +5673,7 @@
         <p:spPr>
           <a:xfrm flipH="1">
             <a:off x="2164935" y="2034824"/>
-            <a:ext cx="1058270" cy="0"/>
+            <a:ext cx="1212428" cy="0"/>
           </a:xfrm>
           <a:prstGeom prst="straightConnector1">
             <a:avLst/>
@@ -5420,8 +5712,8 @@
         </p:nvSpPr>
         <p:spPr>
           <a:xfrm>
-            <a:off x="2288319" y="2005768"/>
-            <a:ext cx="934489" cy="215444"/>
+            <a:off x="2366723" y="1991465"/>
+            <a:ext cx="934489" cy="338554"/>
           </a:xfrm>
           <a:prstGeom prst="rect">
             <a:avLst/>
@@ -5437,9 +5729,10 @@
           </a:bodyPr>
           <a:lstStyle/>
           <a:p>
+            <a:pPr algn="ctr"/>
             <a:r>
               <a:rPr lang="en-US" sz="800" dirty="0"/>
-              <a:t>Copy calc. values</a:t>
+              <a:t>Copy calculated values</a:t>
             </a:r>
           </a:p>
         </p:txBody>
@@ -5559,6 +5852,7 @@
             </a:extLst>
           </p:cNvPr>
           <p:cNvCxnSpPr>
+            <a:cxnSpLocks/>
             <a:stCxn id="44" idx="3"/>
             <a:endCxn id="61" idx="3"/>
           </p:cNvCxnSpPr>
@@ -5567,11 +5861,11 @@
         <p:spPr>
           <a:xfrm flipH="1">
             <a:off x="2177917" y="4353846"/>
-            <a:ext cx="2111113" cy="1767174"/>
+            <a:ext cx="2244463" cy="1767174"/>
           </a:xfrm>
           <a:prstGeom prst="bentConnector3">
             <a:avLst>
-              <a:gd name="adj1" fmla="val -7369"/>
+              <a:gd name="adj1" fmla="val -7130"/>
             </a:avLst>
           </a:prstGeom>
           <a:ln w="9525">
@@ -5611,7 +5905,7 @@
         </p:nvCxnSpPr>
         <p:spPr>
           <a:xfrm>
-            <a:off x="4282680" y="4937577"/>
+            <a:off x="4416030" y="4937577"/>
             <a:ext cx="162320" cy="0"/>
           </a:xfrm>
           <a:prstGeom prst="line">
@@ -5652,7 +5946,7 @@
         </p:nvCxnSpPr>
         <p:spPr>
           <a:xfrm flipV="1">
-            <a:off x="4274777" y="5541751"/>
+            <a:off x="4408127" y="5541751"/>
             <a:ext cx="170223" cy="1"/>
           </a:xfrm>
           <a:prstGeom prst="line">
@@ -5691,8 +5985,8 @@
         </p:nvSpPr>
         <p:spPr>
           <a:xfrm>
-            <a:off x="2278014" y="5950529"/>
-            <a:ext cx="909924" cy="461665"/>
+            <a:off x="2347133" y="5825485"/>
+            <a:ext cx="909924" cy="338554"/>
           </a:xfrm>
           <a:prstGeom prst="rect">
             <a:avLst/>
@@ -5709,13 +6003,6 @@
             <a:r>
               <a:rPr lang="en-US" sz="800" dirty="0"/>
               <a:t>Copy process variables </a:t>
-            </a:r>
-          </a:p>
-          <a:p>
-            <a:pPr algn="ctr"/>
-            <a:r>
-              <a:rPr lang="en-US" sz="800" dirty="0"/>
-              <a:t>from GPU to CPU</a:t>
             </a:r>
           </a:p>
         </p:txBody>
@@ -5908,49 +6195,6 @@
           </a:p>
         </p:txBody>
       </p:sp>
-      <p:cxnSp>
-        <p:nvCxnSpPr>
-          <p:cNvPr id="86" name="Straight Arrow Connector 85">
-            <a:extLst>
-              <a:ext uri="{FF2B5EF4-FFF2-40B4-BE49-F238E27FC236}">
-                <a16:creationId xmlns:a16="http://schemas.microsoft.com/office/drawing/2014/main" id="{732E2640-5DE5-4198-B6F4-0427A95E1FE0}"/>
-              </a:ext>
-            </a:extLst>
-          </p:cNvPr>
-          <p:cNvCxnSpPr>
-            <a:cxnSpLocks/>
-            <a:stCxn id="2" idx="3"/>
-            <a:endCxn id="88" idx="1"/>
-          </p:cNvCxnSpPr>
-          <p:nvPr/>
-        </p:nvCxnSpPr>
-        <p:spPr>
-          <a:xfrm flipV="1">
-            <a:off x="2180484" y="3133734"/>
-            <a:ext cx="353644" cy="7764"/>
-          </a:xfrm>
-          <a:prstGeom prst="straightConnector1">
-            <a:avLst/>
-          </a:prstGeom>
-          <a:ln>
-            <a:tailEnd type="triangle"/>
-          </a:ln>
-        </p:spPr>
-        <p:style>
-          <a:lnRef idx="1">
-            <a:schemeClr val="dk1"/>
-          </a:lnRef>
-          <a:fillRef idx="0">
-            <a:schemeClr val="dk1"/>
-          </a:fillRef>
-          <a:effectRef idx="0">
-            <a:schemeClr val="dk1"/>
-          </a:effectRef>
-          <a:fontRef idx="minor">
-            <a:schemeClr val="tx1"/>
-          </a:fontRef>
-        </p:style>
-      </p:cxnSp>
       <p:sp>
         <p:nvSpPr>
           <p:cNvPr id="87" name="TextBox 86">
@@ -5965,7 +6209,7 @@
         </p:nvSpPr>
         <p:spPr>
           <a:xfrm>
-            <a:off x="2075085" y="2959261"/>
+            <a:off x="2095196" y="2942698"/>
             <a:ext cx="319318" cy="230832"/>
           </a:xfrm>
           <a:prstGeom prst="rect">
@@ -5983,42 +6227,6 @@
               <a:rPr lang="en-US" sz="900" dirty="0"/>
               <a:t>No</a:t>
             </a:r>
-          </a:p>
-        </p:txBody>
-      </p:sp>
-      <p:sp>
-        <p:nvSpPr>
-          <p:cNvPr id="88" name="TextBox 87">
-            <a:extLst>
-              <a:ext uri="{FF2B5EF4-FFF2-40B4-BE49-F238E27FC236}">
-                <a16:creationId xmlns:a16="http://schemas.microsoft.com/office/drawing/2014/main" id="{5BD200E7-0980-4AAC-A93C-25B2AF163621}"/>
-              </a:ext>
-            </a:extLst>
-          </p:cNvPr>
-          <p:cNvSpPr txBox="1"/>
-          <p:nvPr/>
-        </p:nvSpPr>
-        <p:spPr>
-          <a:xfrm>
-            <a:off x="2534128" y="2995234"/>
-            <a:ext cx="466923" cy="276999"/>
-          </a:xfrm>
-          <a:prstGeom prst="rect">
-            <a:avLst/>
-          </a:prstGeom>
-          <a:noFill/>
-        </p:spPr>
-        <p:txBody>
-          <a:bodyPr wrap="none" rtlCol="0">
-            <a:spAutoFit/>
-          </a:bodyPr>
-          <a:lstStyle/>
-          <a:p>
-            <a:r>
-              <a:rPr lang="en-US" sz="1200" dirty="0"/>
-              <a:t>Stop</a:t>
-            </a:r>
-            <a:endParaRPr lang="en-US" sz="1100" dirty="0"/>
           </a:p>
         </p:txBody>
       </p:sp>
@@ -6117,7 +6325,7 @@
                   <a:schemeClr val="tx1"/>
                 </a:solidFill>
               </a:rPr>
-              <a:t>Calculate final d50 values</a:t>
+              <a:t>Calculate final d50 values </a:t>
             </a:r>
             <a:endParaRPr lang="en-US" sz="1013" dirty="0">
               <a:solidFill>
@@ -6310,7 +6518,7 @@
         </p:nvSpPr>
         <p:spPr>
           <a:xfrm>
-            <a:off x="3126978" y="144780"/>
+            <a:off x="3260328" y="144780"/>
             <a:ext cx="1419012" cy="6267414"/>
           </a:xfrm>
           <a:prstGeom prst="roundRect">
@@ -6364,7 +6572,7 @@
         <p:spPr>
           <a:xfrm>
             <a:off x="902874" y="144781"/>
-            <a:ext cx="1447238" cy="8602980"/>
+            <a:ext cx="1511640" cy="8602980"/>
           </a:xfrm>
           <a:prstGeom prst="roundRect">
             <a:avLst/>
@@ -6452,7 +6660,7 @@
         </p:nvSpPr>
         <p:spPr>
           <a:xfrm>
-            <a:off x="3174250" y="162540"/>
+            <a:off x="3307600" y="162540"/>
             <a:ext cx="1410386" cy="369332"/>
           </a:xfrm>
           <a:prstGeom prst="rect">
@@ -6474,6 +6682,52 @@
           </a:p>
         </p:txBody>
       </p:sp>
+      <p:cxnSp>
+        <p:nvCxnSpPr>
+          <p:cNvPr id="15" name="Connector: Elbow 14">
+            <a:extLst>
+              <a:ext uri="{FF2B5EF4-FFF2-40B4-BE49-F238E27FC236}">
+                <a16:creationId xmlns:a16="http://schemas.microsoft.com/office/drawing/2014/main" id="{8CB93E0E-7B5D-4419-80CC-C033C6958225}"/>
+              </a:ext>
+            </a:extLst>
+          </p:cNvPr>
+          <p:cNvCxnSpPr>
+            <a:cxnSpLocks/>
+          </p:cNvCxnSpPr>
+          <p:nvPr/>
+        </p:nvCxnSpPr>
+        <p:spPr>
+          <a:xfrm flipH="1">
+            <a:off x="2177917" y="3135148"/>
+            <a:ext cx="2567" cy="4726101"/>
+          </a:xfrm>
+          <a:prstGeom prst="bentConnector3">
+            <a:avLst>
+              <a:gd name="adj1" fmla="val -6184262"/>
+            </a:avLst>
+          </a:prstGeom>
+          <a:ln>
+            <a:solidFill>
+              <a:schemeClr val="tx1"/>
+            </a:solidFill>
+            <a:tailEnd type="triangle"/>
+          </a:ln>
+        </p:spPr>
+        <p:style>
+          <a:lnRef idx="1">
+            <a:schemeClr val="accent1"/>
+          </a:lnRef>
+          <a:fillRef idx="0">
+            <a:schemeClr val="accent1"/>
+          </a:fillRef>
+          <a:effectRef idx="0">
+            <a:schemeClr val="accent1"/>
+          </a:effectRef>
+          <a:fontRef idx="minor">
+            <a:schemeClr val="tx1"/>
+          </a:fontRef>
+        </p:style>
+      </p:cxnSp>
     </p:spTree>
     <p:extLst>
       <p:ext uri="{BB962C8B-B14F-4D97-AF65-F5344CB8AC3E}">

</xml_diff>